<commit_message>
Adding sample distribution chart
</commit_message>
<xml_diff>
--- a/flu_indicator/data/resources/Project Summary v1.0.pptx
+++ b/flu_indicator/data/resources/Project Summary v1.0.pptx
@@ -11,7 +11,8 @@
     <p:sldId id="260" r:id="rId5"/>
     <p:sldId id="262" r:id="rId6"/>
     <p:sldId id="261" r:id="rId7"/>
-    <p:sldId id="259" r:id="rId8"/>
+    <p:sldId id="263" r:id="rId8"/>
+    <p:sldId id="259" r:id="rId9"/>
   </p:sldIdLst>
   <p:sldSz cx="12192000" cy="6858000"/>
   <p:notesSz cx="6858000" cy="9144000"/>
@@ -110,6 +111,11 @@
       </a:defRPr>
     </a:lvl9pPr>
   </p:defaultTextStyle>
+  <p:extLst>
+    <p:ext uri="{EFAFB233-063F-42B5-8137-9DF3F51BA10A}">
+      <p15:sldGuideLst xmlns:p15="http://schemas.microsoft.com/office/powerpoint/2012/main"/>
+    </p:ext>
+  </p:extLst>
 </p:presentation>
 </file>
 
@@ -260,7 +266,7 @@
           <a:p>
             <a:fld id="{EA05A817-7D09-44FD-9013-88A0B076BD63}" type="datetimeFigureOut">
               <a:rPr lang="en-US" smtClean="0"/>
-              <a:t>8/3/2019</a:t>
+              <a:t>8/5/2019</a:t>
             </a:fld>
             <a:endParaRPr lang="en-US"/>
           </a:p>
@@ -458,7 +464,7 @@
           <a:p>
             <a:fld id="{EA05A817-7D09-44FD-9013-88A0B076BD63}" type="datetimeFigureOut">
               <a:rPr lang="en-US" smtClean="0"/>
-              <a:t>8/3/2019</a:t>
+              <a:t>8/5/2019</a:t>
             </a:fld>
             <a:endParaRPr lang="en-US"/>
           </a:p>
@@ -666,7 +672,7 @@
           <a:p>
             <a:fld id="{EA05A817-7D09-44FD-9013-88A0B076BD63}" type="datetimeFigureOut">
               <a:rPr lang="en-US" smtClean="0"/>
-              <a:t>8/3/2019</a:t>
+              <a:t>8/5/2019</a:t>
             </a:fld>
             <a:endParaRPr lang="en-US"/>
           </a:p>
@@ -864,7 +870,7 @@
           <a:p>
             <a:fld id="{EA05A817-7D09-44FD-9013-88A0B076BD63}" type="datetimeFigureOut">
               <a:rPr lang="en-US" smtClean="0"/>
-              <a:t>8/3/2019</a:t>
+              <a:t>8/5/2019</a:t>
             </a:fld>
             <a:endParaRPr lang="en-US"/>
           </a:p>
@@ -1139,7 +1145,7 @@
           <a:p>
             <a:fld id="{EA05A817-7D09-44FD-9013-88A0B076BD63}" type="datetimeFigureOut">
               <a:rPr lang="en-US" smtClean="0"/>
-              <a:t>8/3/2019</a:t>
+              <a:t>8/5/2019</a:t>
             </a:fld>
             <a:endParaRPr lang="en-US"/>
           </a:p>
@@ -1404,7 +1410,7 @@
           <a:p>
             <a:fld id="{EA05A817-7D09-44FD-9013-88A0B076BD63}" type="datetimeFigureOut">
               <a:rPr lang="en-US" smtClean="0"/>
-              <a:t>8/3/2019</a:t>
+              <a:t>8/5/2019</a:t>
             </a:fld>
             <a:endParaRPr lang="en-US"/>
           </a:p>
@@ -1816,7 +1822,7 @@
           <a:p>
             <a:fld id="{EA05A817-7D09-44FD-9013-88A0B076BD63}" type="datetimeFigureOut">
               <a:rPr lang="en-US" smtClean="0"/>
-              <a:t>8/3/2019</a:t>
+              <a:t>8/5/2019</a:t>
             </a:fld>
             <a:endParaRPr lang="en-US"/>
           </a:p>
@@ -1957,7 +1963,7 @@
           <a:p>
             <a:fld id="{EA05A817-7D09-44FD-9013-88A0B076BD63}" type="datetimeFigureOut">
               <a:rPr lang="en-US" smtClean="0"/>
-              <a:t>8/3/2019</a:t>
+              <a:t>8/5/2019</a:t>
             </a:fld>
             <a:endParaRPr lang="en-US"/>
           </a:p>
@@ -2070,7 +2076,7 @@
           <a:p>
             <a:fld id="{EA05A817-7D09-44FD-9013-88A0B076BD63}" type="datetimeFigureOut">
               <a:rPr lang="en-US" smtClean="0"/>
-              <a:t>8/3/2019</a:t>
+              <a:t>8/5/2019</a:t>
             </a:fld>
             <a:endParaRPr lang="en-US"/>
           </a:p>
@@ -2381,7 +2387,7 @@
           <a:p>
             <a:fld id="{EA05A817-7D09-44FD-9013-88A0B076BD63}" type="datetimeFigureOut">
               <a:rPr lang="en-US" smtClean="0"/>
-              <a:t>8/3/2019</a:t>
+              <a:t>8/5/2019</a:t>
             </a:fld>
             <a:endParaRPr lang="en-US"/>
           </a:p>
@@ -2669,7 +2675,7 @@
           <a:p>
             <a:fld id="{EA05A817-7D09-44FD-9013-88A0B076BD63}" type="datetimeFigureOut">
               <a:rPr lang="en-US" smtClean="0"/>
-              <a:t>8/3/2019</a:t>
+              <a:t>8/5/2019</a:t>
             </a:fld>
             <a:endParaRPr lang="en-US"/>
           </a:p>
@@ -2910,7 +2916,7 @@
           <a:p>
             <a:fld id="{EA05A817-7D09-44FD-9013-88A0B076BD63}" type="datetimeFigureOut">
               <a:rPr lang="en-US" smtClean="0"/>
-              <a:t>8/3/2019</a:t>
+              <a:t>8/5/2019</a:t>
             </a:fld>
             <a:endParaRPr lang="en-US"/>
           </a:p>
@@ -7746,6 +7752,119 @@
           <p:cNvPr id="2" name="Title 1">
             <a:extLst>
               <a:ext uri="{FF2B5EF4-FFF2-40B4-BE49-F238E27FC236}">
+                <a16:creationId xmlns:a16="http://schemas.microsoft.com/office/drawing/2014/main" id="{9489F105-DB7F-407E-9B1F-27BCCCAF0C27}"/>
+              </a:ext>
+            </a:extLst>
+          </p:cNvPr>
+          <p:cNvSpPr>
+            <a:spLocks noGrp="1"/>
+          </p:cNvSpPr>
+          <p:nvPr>
+            <p:ph type="title"/>
+          </p:nvPr>
+        </p:nvSpPr>
+        <p:spPr/>
+        <p:txBody>
+          <a:bodyPr/>
+          <a:lstStyle/>
+          <a:p>
+            <a:r>
+              <a:rPr lang="en-US" dirty="0"/>
+              <a:t>Sample Distribution</a:t>
+            </a:r>
+          </a:p>
+        </p:txBody>
+      </p:sp>
+      <p:sp>
+        <p:nvSpPr>
+          <p:cNvPr id="3" name="Content Placeholder 2">
+            <a:extLst>
+              <a:ext uri="{FF2B5EF4-FFF2-40B4-BE49-F238E27FC236}">
+                <a16:creationId xmlns:a16="http://schemas.microsoft.com/office/drawing/2014/main" id="{C5FAE391-9718-430C-B77E-7A5A5B058856}"/>
+              </a:ext>
+            </a:extLst>
+          </p:cNvPr>
+          <p:cNvSpPr>
+            <a:spLocks noGrp="1"/>
+          </p:cNvSpPr>
+          <p:nvPr>
+            <p:ph idx="1"/>
+          </p:nvPr>
+        </p:nvSpPr>
+        <p:spPr/>
+        <p:txBody>
+          <a:bodyPr/>
+          <a:lstStyle/>
+          <a:p>
+            <a:endParaRPr lang="en-US" dirty="0"/>
+          </a:p>
+        </p:txBody>
+      </p:sp>
+      <p:pic>
+        <p:nvPicPr>
+          <p:cNvPr id="4" name="Picture 3">
+            <a:extLst>
+              <a:ext uri="{FF2B5EF4-FFF2-40B4-BE49-F238E27FC236}">
+                <a16:creationId xmlns:a16="http://schemas.microsoft.com/office/drawing/2014/main" id="{4F199F64-4B2C-4BEC-819E-097FB3CA2534}"/>
+              </a:ext>
+            </a:extLst>
+          </p:cNvPr>
+          <p:cNvPicPr>
+            <a:picLocks noChangeAspect="1"/>
+          </p:cNvPicPr>
+          <p:nvPr/>
+        </p:nvPicPr>
+        <p:blipFill>
+          <a:blip r:embed="rId2"/>
+          <a:stretch>
+            <a:fillRect/>
+          </a:stretch>
+        </p:blipFill>
+        <p:spPr>
+          <a:xfrm>
+            <a:off x="838200" y="1825625"/>
+            <a:ext cx="6180805" cy="3868165"/>
+          </a:xfrm>
+          <a:prstGeom prst="rect">
+            <a:avLst/>
+          </a:prstGeom>
+        </p:spPr>
+      </p:pic>
+    </p:spTree>
+    <p:extLst>
+      <p:ext uri="{BB962C8B-B14F-4D97-AF65-F5344CB8AC3E}">
+        <p14:creationId xmlns:p14="http://schemas.microsoft.com/office/powerpoint/2010/main" val="2090209073"/>
+      </p:ext>
+    </p:extLst>
+  </p:cSld>
+  <p:clrMapOvr>
+    <a:masterClrMapping/>
+  </p:clrMapOvr>
+</p:sld>
+</file>
+
+<file path=ppt/slides/slide8.xml><?xml version="1.0" encoding="utf-8"?>
+<p:sld xmlns:a="http://schemas.openxmlformats.org/drawingml/2006/main" xmlns:r="http://schemas.openxmlformats.org/officeDocument/2006/relationships" xmlns:p="http://schemas.openxmlformats.org/presentationml/2006/main">
+  <p:cSld>
+    <p:spTree>
+      <p:nvGrpSpPr>
+        <p:cNvPr id="1" name=""/>
+        <p:cNvGrpSpPr/>
+        <p:nvPr/>
+      </p:nvGrpSpPr>
+      <p:grpSpPr>
+        <a:xfrm>
+          <a:off x="0" y="0"/>
+          <a:ext cx="0" cy="0"/>
+          <a:chOff x="0" y="0"/>
+          <a:chExt cx="0" cy="0"/>
+        </a:xfrm>
+      </p:grpSpPr>
+      <p:sp>
+        <p:nvSpPr>
+          <p:cNvPr id="2" name="Title 1">
+            <a:extLst>
+              <a:ext uri="{FF2B5EF4-FFF2-40B4-BE49-F238E27FC236}">
                 <a16:creationId xmlns:a16="http://schemas.microsoft.com/office/drawing/2014/main" id="{D4F6EA3D-6E41-46D6-9390-AF456A521CC0}"/>
               </a:ext>
             </a:extLst>

</xml_diff>